<commit_message>
`CatsController.scala` - Moved validation to a function
`OptionsController.scala`
- Added reasons for failures

'Modeling Data Validations.ppt'
- Updated ppt with new code snippets
</commit_message>
<xml_diff>
--- a/ppt/Modeling Data Validations.pptx
+++ b/ppt/Modeling Data Validations.pptx
@@ -7,11 +7,15 @@
   <p:sldIdLst>
     <p:sldId id="256" r:id="rId2"/>
     <p:sldId id="257" r:id="rId3"/>
-    <p:sldId id="258" r:id="rId4"/>
-    <p:sldId id="259" r:id="rId5"/>
-    <p:sldId id="260" r:id="rId6"/>
-    <p:sldId id="261" r:id="rId7"/>
-    <p:sldId id="262" r:id="rId8"/>
+    <p:sldId id="263" r:id="rId4"/>
+    <p:sldId id="258" r:id="rId5"/>
+    <p:sldId id="264" r:id="rId6"/>
+    <p:sldId id="259" r:id="rId7"/>
+    <p:sldId id="265" r:id="rId8"/>
+    <p:sldId id="260" r:id="rId9"/>
+    <p:sldId id="267" r:id="rId10"/>
+    <p:sldId id="261" r:id="rId11"/>
+    <p:sldId id="262" r:id="rId12"/>
   </p:sldIdLst>
   <p:sldSz cx="9144000" cy="6858000" type="screen4x3"/>
   <p:notesSz cx="6858000" cy="9144000"/>
@@ -350,7 +354,7 @@
           <a:p>
             <a:fld id="{2069C06D-4ED8-42C6-905D-CA84CA1B6CBF}" type="datetime2">
               <a:rPr lang="en-US" smtClean="0"/>
-              <a:t>Monday, May 22, 17</a:t>
+              <a:t>Wednesday, May 24, 17</a:t>
             </a:fld>
             <a:endParaRPr lang="en-US" dirty="0"/>
           </a:p>
@@ -521,7 +525,7 @@
           <a:p>
             <a:fld id="{A56EEE0E-EDB0-4D84-86B0-50833DF22902}" type="datetime2">
               <a:rPr lang="en-US" smtClean="0"/>
-              <a:t>Monday, May 22, 17</a:t>
+              <a:t>Wednesday, May 24, 17</a:t>
             </a:fld>
             <a:endParaRPr lang="en-US"/>
           </a:p>
@@ -697,7 +701,7 @@
           <a:p>
             <a:fld id="{5114372C-B5AB-4C39-B273-B99224EB4DD5}" type="datetime2">
               <a:rPr lang="en-US" smtClean="0"/>
-              <a:t>Monday, May 22, 17</a:t>
+              <a:t>Wednesday, May 24, 17</a:t>
             </a:fld>
             <a:endParaRPr lang="en-US"/>
           </a:p>
@@ -863,7 +867,7 @@
           <a:p>
             <a:fld id="{14CB1CAA-32CD-4B55-B92A-B8F0843CACF4}" type="datetime2">
               <a:rPr lang="en-US" smtClean="0"/>
-              <a:t>Monday, May 22, 17</a:t>
+              <a:t>Wednesday, May 24, 17</a:t>
             </a:fld>
             <a:endParaRPr lang="en-US" dirty="0"/>
           </a:p>
@@ -1121,7 +1125,7 @@
           <a:p>
             <a:fld id="{3AD8CDC4-3D19-4983-B478-82F6B8E5AB66}" type="datetime2">
               <a:rPr lang="en-US" smtClean="0"/>
-              <a:t>Monday, May 22, 17</a:t>
+              <a:t>Wednesday, May 24, 17</a:t>
             </a:fld>
             <a:endParaRPr lang="en-US" dirty="0"/>
           </a:p>
@@ -1262,7 +1266,7 @@
           <a:p>
             <a:fld id="{84B82477-D5D3-4181-8C11-75D0F2433A87}" type="datetime2">
               <a:rPr lang="en-US" smtClean="0"/>
-              <a:t>Monday, May 22, 17</a:t>
+              <a:t>Wednesday, May 24, 17</a:t>
             </a:fld>
             <a:endParaRPr lang="en-US" dirty="0"/>
           </a:p>
@@ -1913,7 +1917,7 @@
           <a:p>
             <a:fld id="{213E253B-1893-4367-8BAE-DF4BC10DC578}" type="datetime2">
               <a:rPr lang="en-US" smtClean="0"/>
-              <a:t>Monday, May 22, 17</a:t>
+              <a:t>Wednesday, May 24, 17</a:t>
             </a:fld>
             <a:endParaRPr lang="en-US" dirty="0"/>
           </a:p>
@@ -2027,7 +2031,7 @@
           <a:p>
             <a:fld id="{8B62300D-25B3-4603-86C9-4CB776489F00}" type="datetime2">
               <a:rPr lang="en-US" smtClean="0"/>
-              <a:t>Monday, May 22, 17</a:t>
+              <a:t>Wednesday, May 24, 17</a:t>
             </a:fld>
             <a:endParaRPr lang="en-US" dirty="0"/>
           </a:p>
@@ -2118,7 +2122,7 @@
           <a:p>
             <a:fld id="{C6314AD9-FCC8-48B7-B85B-012A91320DFF}" type="datetime2">
               <a:rPr lang="en-US" smtClean="0"/>
-              <a:t>Monday, May 22, 17</a:t>
+              <a:t>Wednesday, May 24, 17</a:t>
             </a:fld>
             <a:endParaRPr lang="en-US" dirty="0"/>
           </a:p>
@@ -2409,7 +2413,7 @@
           <a:p>
             <a:fld id="{3182DC50-D5DB-4F94-B367-9876CD2C4012}" type="datetime2">
               <a:rPr lang="en-US" smtClean="0"/>
-              <a:t>Monday, May 22, 17</a:t>
+              <a:t>Wednesday, May 24, 17</a:t>
             </a:fld>
             <a:endParaRPr lang="en-US" dirty="0"/>
           </a:p>
@@ -2733,7 +2737,7 @@
           <a:p>
             <a:fld id="{292EB412-E790-42EA-81FE-2925D3A43D91}" type="datetime2">
               <a:rPr lang="en-US" smtClean="0"/>
-              <a:t>Monday, May 22, 17</a:t>
+              <a:t>Wednesday, May 24, 17</a:t>
             </a:fld>
             <a:endParaRPr lang="en-US" dirty="0"/>
           </a:p>
@@ -3191,7 +3195,7 @@
           <a:p>
             <a:fld id="{0B385921-A91A-409C-921C-0E0EC1E750EC}" type="datetime2">
               <a:rPr lang="en-US" smtClean="0"/>
-              <a:t>Monday, May 22, 17</a:t>
+              <a:t>Wednesday, May 24, 17</a:t>
             </a:fld>
             <a:endParaRPr lang="en-US" dirty="0"/>
           </a:p>
@@ -3729,7 +3733,7 @@
             </a:r>
             <a:r>
               <a:rPr lang="en-US" sz="4800" dirty="0" smtClean="0"/>
-              <a:t>Validation</a:t>
+              <a:t>Validations</a:t>
             </a:r>
             <a:endParaRPr lang="en-US" sz="4800" dirty="0"/>
           </a:p>
@@ -3802,6 +3806,253 @@
     <p:extLst>
       <p:ext uri="{BB962C8B-B14F-4D97-AF65-F5344CB8AC3E}">
         <p14:creationId xmlns:p14="http://schemas.microsoft.com/office/powerpoint/2010/main" val="2586162322"/>
+      </p:ext>
+    </p:extLst>
+  </p:cSld>
+  <p:clrMapOvr>
+    <a:masterClrMapping/>
+  </p:clrMapOvr>
+  <p:timing>
+    <p:tnLst>
+      <p:par>
+        <p:cTn xmlns:p14="http://schemas.microsoft.com/office/powerpoint/2010/main" id="1" dur="indefinite" restart="never" nodeType="tmRoot"/>
+      </p:par>
+    </p:tnLst>
+  </p:timing>
+</p:sld>
+</file>
+
+<file path=ppt/slides/slide10.xml><?xml version="1.0" encoding="utf-8"?>
+<p:sld xmlns:a="http://schemas.openxmlformats.org/drawingml/2006/main" xmlns:r="http://schemas.openxmlformats.org/officeDocument/2006/relationships" xmlns:p="http://schemas.openxmlformats.org/presentationml/2006/main">
+  <p:cSld>
+    <p:spTree>
+      <p:nvGrpSpPr>
+        <p:cNvPr id="1" name=""/>
+        <p:cNvGrpSpPr/>
+        <p:nvPr/>
+      </p:nvGrpSpPr>
+      <p:grpSpPr>
+        <a:xfrm>
+          <a:off x="0" y="0"/>
+          <a:ext cx="0" cy="0"/>
+          <a:chOff x="0" y="0"/>
+          <a:chExt cx="0" cy="0"/>
+        </a:xfrm>
+      </p:grpSpPr>
+      <p:sp>
+        <p:nvSpPr>
+          <p:cNvPr id="3" name="Title 2"/>
+          <p:cNvSpPr>
+            <a:spLocks noGrp="1"/>
+          </p:cNvSpPr>
+          <p:nvPr>
+            <p:ph type="title"/>
+          </p:nvPr>
+        </p:nvSpPr>
+        <p:spPr>
+          <a:xfrm>
+            <a:off x="496025" y="96157"/>
+            <a:ext cx="7543800" cy="914400"/>
+          </a:xfrm>
+        </p:spPr>
+        <p:txBody>
+          <a:bodyPr/>
+          <a:lstStyle/>
+          <a:p>
+            <a:pPr algn="ctr"/>
+            <a:r>
+              <a:rPr lang="en-US" dirty="0" smtClean="0">
+                <a:cs typeface="Abadi MT Condensed Extra Bold"/>
+              </a:rPr>
+              <a:t>CATS </a:t>
+            </a:r>
+            <a:r>
+              <a:rPr lang="en-US" dirty="0" err="1" smtClean="0">
+                <a:cs typeface="Abadi MT Condensed Extra Bold"/>
+              </a:rPr>
+              <a:t>Nel</a:t>
+            </a:r>
+            <a:r>
+              <a:rPr lang="en-US" dirty="0" smtClean="0">
+                <a:cs typeface="Abadi MT Condensed Extra Bold"/>
+              </a:rPr>
+              <a:t>…</a:t>
+            </a:r>
+            <a:endParaRPr lang="en-US" dirty="0">
+              <a:cs typeface="Abadi MT Condensed Extra Bold"/>
+            </a:endParaRPr>
+          </a:p>
+        </p:txBody>
+      </p:sp>
+      <p:pic>
+        <p:nvPicPr>
+          <p:cNvPr id="2" name="Picture 1"/>
+          <p:cNvPicPr>
+            <a:picLocks noChangeAspect="1"/>
+          </p:cNvPicPr>
+          <p:nvPr/>
+        </p:nvPicPr>
+        <p:blipFill>
+          <a:blip r:embed="rId2"/>
+          <a:stretch>
+            <a:fillRect/>
+          </a:stretch>
+        </p:blipFill>
+        <p:spPr>
+          <a:xfrm>
+            <a:off x="496025" y="1846054"/>
+            <a:ext cx="6930571" cy="4878129"/>
+          </a:xfrm>
+          <a:prstGeom prst="rect">
+            <a:avLst/>
+          </a:prstGeom>
+        </p:spPr>
+      </p:pic>
+      <p:pic>
+        <p:nvPicPr>
+          <p:cNvPr id="6" name="Picture 5"/>
+          <p:cNvPicPr>
+            <a:picLocks noChangeAspect="1"/>
+          </p:cNvPicPr>
+          <p:nvPr/>
+        </p:nvPicPr>
+        <p:blipFill>
+          <a:blip r:embed="rId3"/>
+          <a:stretch>
+            <a:fillRect/>
+          </a:stretch>
+        </p:blipFill>
+        <p:spPr>
+          <a:xfrm>
+            <a:off x="496025" y="1010557"/>
+            <a:ext cx="4644207" cy="735716"/>
+          </a:xfrm>
+          <a:prstGeom prst="rect">
+            <a:avLst/>
+          </a:prstGeom>
+        </p:spPr>
+      </p:pic>
+    </p:spTree>
+    <p:extLst>
+      <p:ext uri="{BB962C8B-B14F-4D97-AF65-F5344CB8AC3E}">
+        <p14:creationId xmlns:p14="http://schemas.microsoft.com/office/powerpoint/2010/main" val="2782403922"/>
+      </p:ext>
+    </p:extLst>
+  </p:cSld>
+  <p:clrMapOvr>
+    <a:masterClrMapping/>
+  </p:clrMapOvr>
+  <p:timing>
+    <p:tnLst>
+      <p:par>
+        <p:cTn xmlns:p14="http://schemas.microsoft.com/office/powerpoint/2010/main" id="1" dur="indefinite" restart="never" nodeType="tmRoot"/>
+      </p:par>
+    </p:tnLst>
+  </p:timing>
+</p:sld>
+</file>
+
+<file path=ppt/slides/slide11.xml><?xml version="1.0" encoding="utf-8"?>
+<p:sld xmlns:a="http://schemas.openxmlformats.org/drawingml/2006/main" xmlns:r="http://schemas.openxmlformats.org/officeDocument/2006/relationships" xmlns:p="http://schemas.openxmlformats.org/presentationml/2006/main">
+  <p:cSld>
+    <p:spTree>
+      <p:nvGrpSpPr>
+        <p:cNvPr id="1" name=""/>
+        <p:cNvGrpSpPr/>
+        <p:nvPr/>
+      </p:nvGrpSpPr>
+      <p:grpSpPr>
+        <a:xfrm>
+          <a:off x="0" y="0"/>
+          <a:ext cx="0" cy="0"/>
+          <a:chOff x="0" y="0"/>
+          <a:chExt cx="0" cy="0"/>
+        </a:xfrm>
+      </p:grpSpPr>
+      <p:sp>
+        <p:nvSpPr>
+          <p:cNvPr id="3" name="Title 2"/>
+          <p:cNvSpPr>
+            <a:spLocks noGrp="1"/>
+          </p:cNvSpPr>
+          <p:nvPr>
+            <p:ph type="title"/>
+          </p:nvPr>
+        </p:nvSpPr>
+        <p:spPr>
+          <a:xfrm>
+            <a:off x="496025" y="96157"/>
+            <a:ext cx="7543800" cy="914400"/>
+          </a:xfrm>
+        </p:spPr>
+        <p:txBody>
+          <a:bodyPr/>
+          <a:lstStyle/>
+          <a:p>
+            <a:pPr algn="ctr"/>
+            <a:r>
+              <a:rPr lang="en-US" sz="4000" dirty="0" smtClean="0">
+                <a:cs typeface="Abadi MT Condensed Extra Bold"/>
+              </a:rPr>
+              <a:t>Final Solution Recommended</a:t>
+            </a:r>
+          </a:p>
+        </p:txBody>
+      </p:sp>
+      <p:sp>
+        <p:nvSpPr>
+          <p:cNvPr id="4" name="TextBox 3"/>
+          <p:cNvSpPr txBox="1"/>
+          <p:nvPr/>
+        </p:nvSpPr>
+        <p:spPr>
+          <a:xfrm>
+            <a:off x="1096868" y="1335934"/>
+            <a:ext cx="7117269" cy="369332"/>
+          </a:xfrm>
+          <a:prstGeom prst="rect">
+            <a:avLst/>
+          </a:prstGeom>
+          <a:noFill/>
+        </p:spPr>
+        <p:txBody>
+          <a:bodyPr wrap="square" rtlCol="0">
+            <a:spAutoFit/>
+          </a:bodyPr>
+          <a:lstStyle/>
+          <a:p>
+            <a:pPr marL="285750" indent="-285750">
+              <a:buFont typeface="Arial"/>
+              <a:buChar char="•"/>
+            </a:pPr>
+            <a:r>
+              <a:rPr lang="en-US" dirty="0" smtClean="0"/>
+              <a:t>Use </a:t>
+            </a:r>
+            <a:r>
+              <a:rPr lang="en-US" dirty="0" err="1" smtClean="0"/>
+              <a:t>Json</a:t>
+            </a:r>
+            <a:r>
+              <a:rPr lang="en-US" dirty="0" smtClean="0"/>
+              <a:t> </a:t>
+            </a:r>
+            <a:r>
+              <a:rPr lang="en-US" dirty="0" err="1" smtClean="0"/>
+              <a:t>Combinators</a:t>
+            </a:r>
+            <a:r>
+              <a:rPr lang="en-US" dirty="0" smtClean="0"/>
+              <a:t> + CATS</a:t>
+            </a:r>
+            <a:endParaRPr lang="en-US" dirty="0"/>
+          </a:p>
+        </p:txBody>
+      </p:sp>
+    </p:spTree>
+    <p:extLst>
+      <p:ext uri="{BB962C8B-B14F-4D97-AF65-F5344CB8AC3E}">
+        <p14:creationId xmlns:p14="http://schemas.microsoft.com/office/powerpoint/2010/main" val="3542924606"/>
       </p:ext>
     </p:extLst>
   </p:cSld>
@@ -3921,7 +4172,31 @@
         <p:spPr>
           <a:xfrm>
             <a:off x="432525" y="4261757"/>
-            <a:ext cx="5930900" cy="1587500"/>
+            <a:ext cx="4946832" cy="1324099"/>
+          </a:xfrm>
+          <a:prstGeom prst="rect">
+            <a:avLst/>
+          </a:prstGeom>
+        </p:spPr>
+      </p:pic>
+      <p:pic>
+        <p:nvPicPr>
+          <p:cNvPr id="2" name="Picture 1"/>
+          <p:cNvPicPr>
+            <a:picLocks noChangeAspect="1"/>
+          </p:cNvPicPr>
+          <p:nvPr/>
+        </p:nvPicPr>
+        <p:blipFill>
+          <a:blip r:embed="rId4"/>
+          <a:stretch>
+            <a:fillRect/>
+          </a:stretch>
+        </p:blipFill>
+        <p:spPr>
+          <a:xfrm>
+            <a:off x="5531667" y="4261756"/>
+            <a:ext cx="3534320" cy="1324099"/>
           </a:xfrm>
           <a:prstGeom prst="rect">
             <a:avLst/>
@@ -3987,10 +4262,22 @@
           <a:p>
             <a:pPr algn="ctr"/>
             <a:r>
+              <a:rPr lang="en-US" dirty="0" err="1" smtClean="0">
+                <a:cs typeface="Abadi MT Condensed Extra Bold"/>
+              </a:rPr>
+              <a:t>Json</a:t>
+            </a:r>
+            <a:r>
               <a:rPr lang="en-US" dirty="0" smtClean="0">
                 <a:cs typeface="Abadi MT Condensed Extra Bold"/>
               </a:rPr>
-              <a:t>Options</a:t>
+              <a:t> </a:t>
+            </a:r>
+            <a:r>
+              <a:rPr lang="en-US" dirty="0" err="1" smtClean="0">
+                <a:cs typeface="Abadi MT Condensed Extra Bold"/>
+              </a:rPr>
+              <a:t>Combinators</a:t>
             </a:r>
             <a:endParaRPr lang="en-US" dirty="0">
               <a:cs typeface="Abadi MT Condensed Extra Bold"/>
@@ -3998,130 +4285,123 @@
           </a:p>
         </p:txBody>
       </p:sp>
-      <p:pic>
-        <p:nvPicPr>
-          <p:cNvPr id="2" name="Picture 1"/>
-          <p:cNvPicPr>
-            <a:picLocks noChangeAspect="1"/>
-          </p:cNvPicPr>
+      <p:sp>
+        <p:nvSpPr>
+          <p:cNvPr id="4" name="TextBox 3"/>
+          <p:cNvSpPr txBox="1"/>
           <p:nvPr/>
-        </p:nvPicPr>
-        <p:blipFill>
-          <a:blip r:embed="rId2"/>
-          <a:stretch>
-            <a:fillRect/>
-          </a:stretch>
-        </p:blipFill>
-        <p:spPr>
-          <a:xfrm>
-            <a:off x="286658" y="2552700"/>
-            <a:ext cx="4657272" cy="892064"/>
+        </p:nvSpPr>
+        <p:spPr>
+          <a:xfrm>
+            <a:off x="1061356" y="1587500"/>
+            <a:ext cx="6585858" cy="2585323"/>
           </a:xfrm>
           <a:prstGeom prst="rect">
             <a:avLst/>
           </a:prstGeom>
-        </p:spPr>
-      </p:pic>
-      <p:pic>
-        <p:nvPicPr>
-          <p:cNvPr id="4" name="Picture 3"/>
-          <p:cNvPicPr>
-            <a:picLocks noChangeAspect="1"/>
-          </p:cNvPicPr>
-          <p:nvPr/>
-        </p:nvPicPr>
-        <p:blipFill>
-          <a:blip r:embed="rId3"/>
-          <a:stretch>
-            <a:fillRect/>
-          </a:stretch>
-        </p:blipFill>
-        <p:spPr>
-          <a:xfrm>
-            <a:off x="286657" y="3566884"/>
-            <a:ext cx="4657272" cy="955338"/>
-          </a:xfrm>
-          <a:prstGeom prst="rect">
-            <a:avLst/>
-          </a:prstGeom>
-        </p:spPr>
-      </p:pic>
-      <p:pic>
-        <p:nvPicPr>
-          <p:cNvPr id="5" name="Picture 4"/>
-          <p:cNvPicPr>
-            <a:picLocks noChangeAspect="1"/>
-          </p:cNvPicPr>
-          <p:nvPr/>
-        </p:nvPicPr>
-        <p:blipFill>
-          <a:blip r:embed="rId4"/>
-          <a:stretch>
-            <a:fillRect/>
-          </a:stretch>
-        </p:blipFill>
-        <p:spPr>
-          <a:xfrm>
-            <a:off x="286657" y="4610097"/>
-            <a:ext cx="4657272" cy="1007642"/>
-          </a:xfrm>
-          <a:prstGeom prst="rect">
-            <a:avLst/>
-          </a:prstGeom>
-        </p:spPr>
-      </p:pic>
-      <p:pic>
-        <p:nvPicPr>
-          <p:cNvPr id="6" name="Picture 5"/>
-          <p:cNvPicPr>
-            <a:picLocks noChangeAspect="1"/>
-          </p:cNvPicPr>
-          <p:nvPr/>
-        </p:nvPicPr>
-        <p:blipFill>
-          <a:blip r:embed="rId5"/>
-          <a:stretch>
-            <a:fillRect/>
-          </a:stretch>
-        </p:blipFill>
-        <p:spPr>
-          <a:xfrm>
-            <a:off x="286657" y="5696852"/>
-            <a:ext cx="4657272" cy="834600"/>
-          </a:xfrm>
-          <a:prstGeom prst="rect">
-            <a:avLst/>
-          </a:prstGeom>
-        </p:spPr>
-      </p:pic>
-      <p:pic>
-        <p:nvPicPr>
-          <p:cNvPr id="7" name="Picture 6"/>
-          <p:cNvPicPr>
-            <a:picLocks noChangeAspect="1"/>
-          </p:cNvPicPr>
-          <p:nvPr/>
-        </p:nvPicPr>
-        <p:blipFill>
-          <a:blip r:embed="rId6"/>
-          <a:stretch>
-            <a:fillRect/>
-          </a:stretch>
-        </p:blipFill>
-        <p:spPr>
-          <a:xfrm>
-            <a:off x="286657" y="1099457"/>
-            <a:ext cx="7556500" cy="1320800"/>
-          </a:xfrm>
-          <a:prstGeom prst="rect">
-            <a:avLst/>
-          </a:prstGeom>
-        </p:spPr>
-      </p:pic>
+          <a:noFill/>
+        </p:spPr>
+        <p:txBody>
+          <a:bodyPr wrap="square" rtlCol="0">
+            <a:spAutoFit/>
+          </a:bodyPr>
+          <a:lstStyle/>
+          <a:p>
+            <a:pPr marL="285750" indent="-285750">
+              <a:buFont typeface="Arial"/>
+              <a:buChar char="•"/>
+            </a:pPr>
+            <a:r>
+              <a:rPr lang="en-US" dirty="0" smtClean="0"/>
+              <a:t>Pros</a:t>
+            </a:r>
+          </a:p>
+          <a:p>
+            <a:pPr marL="742950" lvl="1" indent="-285750">
+              <a:buFont typeface="Arial"/>
+              <a:buChar char="•"/>
+            </a:pPr>
+            <a:r>
+              <a:rPr lang="en-US" dirty="0" smtClean="0"/>
+              <a:t>No boilerplate code </a:t>
+            </a:r>
+          </a:p>
+          <a:p>
+            <a:pPr marL="742950" lvl="1" indent="-285750">
+              <a:buFont typeface="Arial"/>
+              <a:buChar char="•"/>
+            </a:pPr>
+            <a:r>
+              <a:rPr lang="en-US" dirty="0" smtClean="0"/>
+              <a:t>Default validation functions like max, </a:t>
+            </a:r>
+            <a:r>
+              <a:rPr lang="en-US" dirty="0" err="1" smtClean="0"/>
+              <a:t>minLength</a:t>
+            </a:r>
+            <a:r>
+              <a:rPr lang="en-US" dirty="0" smtClean="0"/>
+              <a:t> </a:t>
+            </a:r>
+            <a:r>
+              <a:rPr lang="en-US" dirty="0" err="1" smtClean="0"/>
+              <a:t>etc</a:t>
+            </a:r>
+            <a:r>
+              <a:rPr lang="en-US" dirty="0" smtClean="0"/>
+              <a:t> are available</a:t>
+            </a:r>
+          </a:p>
+          <a:p>
+            <a:pPr marL="742950" lvl="1" indent="-285750">
+              <a:buFont typeface="Arial"/>
+              <a:buChar char="•"/>
+            </a:pPr>
+            <a:endParaRPr lang="en-US" dirty="0"/>
+          </a:p>
+          <a:p>
+            <a:pPr marL="285750" indent="-285750">
+              <a:buFont typeface="Arial"/>
+              <a:buChar char="•"/>
+            </a:pPr>
+            <a:r>
+              <a:rPr lang="en-US" dirty="0" smtClean="0"/>
+              <a:t>Cons</a:t>
+            </a:r>
+          </a:p>
+          <a:p>
+            <a:pPr marL="742950" lvl="1" indent="-285750">
+              <a:buFont typeface="Arial"/>
+              <a:buChar char="•"/>
+            </a:pPr>
+            <a:r>
+              <a:rPr lang="en-US" dirty="0" smtClean="0"/>
+              <a:t>Complicated data structure on failures </a:t>
+            </a:r>
+          </a:p>
+          <a:p>
+            <a:pPr marL="742950" lvl="1" indent="-285750">
+              <a:buFont typeface="Arial"/>
+              <a:buChar char="•"/>
+            </a:pPr>
+            <a:r>
+              <a:rPr lang="en-US" dirty="0" smtClean="0"/>
+              <a:t>Difficult to add custom validations</a:t>
+            </a:r>
+          </a:p>
+          <a:p>
+            <a:pPr marL="742950" lvl="1" indent="-285750">
+              <a:buFont typeface="Arial"/>
+              <a:buChar char="•"/>
+            </a:pPr>
+            <a:endParaRPr lang="en-US" dirty="0"/>
+          </a:p>
+        </p:txBody>
+      </p:sp>
     </p:spTree>
     <p:extLst>
       <p:ext uri="{BB962C8B-B14F-4D97-AF65-F5344CB8AC3E}">
-        <p14:creationId xmlns:p14="http://schemas.microsoft.com/office/powerpoint/2010/main" val="1161470921"/>
+        <p14:creationId xmlns:p14="http://schemas.microsoft.com/office/powerpoint/2010/main" val="962482989"/>
       </p:ext>
     </p:extLst>
   </p:cSld>
@@ -4180,7 +4460,7 @@
               <a:rPr lang="en-US" dirty="0" smtClean="0">
                 <a:cs typeface="Abadi MT Condensed Extra Bold"/>
               </a:rPr>
-              <a:t>Either</a:t>
+              <a:t>Options</a:t>
             </a:r>
             <a:endParaRPr lang="en-US" dirty="0">
               <a:cs typeface="Abadi MT Condensed Extra Bold"/>
@@ -4204,8 +4484,8 @@
         </p:blipFill>
         <p:spPr>
           <a:xfrm>
-            <a:off x="139699" y="2975663"/>
-            <a:ext cx="7265931" cy="848968"/>
+            <a:off x="286657" y="1239720"/>
+            <a:ext cx="6718300" cy="1435100"/>
           </a:xfrm>
           <a:prstGeom prst="rect">
             <a:avLst/>
@@ -4228,80 +4508,8 @@
         </p:blipFill>
         <p:spPr>
           <a:xfrm>
-            <a:off x="139700" y="3915341"/>
-            <a:ext cx="7265931" cy="892508"/>
-          </a:xfrm>
-          <a:prstGeom prst="rect">
-            <a:avLst/>
-          </a:prstGeom>
-        </p:spPr>
-      </p:pic>
-      <p:pic>
-        <p:nvPicPr>
-          <p:cNvPr id="10" name="Picture 9"/>
-          <p:cNvPicPr>
-            <a:picLocks noChangeAspect="1"/>
-          </p:cNvPicPr>
-          <p:nvPr/>
-        </p:nvPicPr>
-        <p:blipFill>
-          <a:blip r:embed="rId4"/>
-          <a:stretch>
-            <a:fillRect/>
-          </a:stretch>
-        </p:blipFill>
-        <p:spPr>
-          <a:xfrm>
-            <a:off x="139700" y="4904455"/>
-            <a:ext cx="7265931" cy="892508"/>
-          </a:xfrm>
-          <a:prstGeom prst="rect">
-            <a:avLst/>
-          </a:prstGeom>
-        </p:spPr>
-      </p:pic>
-      <p:pic>
-        <p:nvPicPr>
-          <p:cNvPr id="11" name="Picture 10"/>
-          <p:cNvPicPr>
-            <a:picLocks noChangeAspect="1"/>
-          </p:cNvPicPr>
-          <p:nvPr/>
-        </p:nvPicPr>
-        <p:blipFill>
-          <a:blip r:embed="rId5"/>
-          <a:stretch>
-            <a:fillRect/>
-          </a:stretch>
-        </p:blipFill>
-        <p:spPr>
-          <a:xfrm>
-            <a:off x="181146" y="5861951"/>
-            <a:ext cx="7224485" cy="887417"/>
-          </a:xfrm>
-          <a:prstGeom prst="rect">
-            <a:avLst/>
-          </a:prstGeom>
-        </p:spPr>
-      </p:pic>
-      <p:pic>
-        <p:nvPicPr>
-          <p:cNvPr id="12" name="Picture 11"/>
-          <p:cNvPicPr>
-            <a:picLocks noChangeAspect="1"/>
-          </p:cNvPicPr>
-          <p:nvPr/>
-        </p:nvPicPr>
-        <p:blipFill>
-          <a:blip r:embed="rId6"/>
-          <a:stretch>
-            <a:fillRect/>
-          </a:stretch>
-        </p:blipFill>
-        <p:spPr>
-          <a:xfrm>
-            <a:off x="139700" y="1010557"/>
-            <a:ext cx="7543800" cy="1872421"/>
+            <a:off x="286657" y="2791726"/>
+            <a:ext cx="4936774" cy="3896288"/>
           </a:xfrm>
           <a:prstGeom prst="rect">
             <a:avLst/>
@@ -4311,7 +4519,7 @@
     </p:spTree>
     <p:extLst>
       <p:ext uri="{BB962C8B-B14F-4D97-AF65-F5344CB8AC3E}">
-        <p14:creationId xmlns:p14="http://schemas.microsoft.com/office/powerpoint/2010/main" val="2459738090"/>
+        <p14:creationId xmlns:p14="http://schemas.microsoft.com/office/powerpoint/2010/main" val="1161470921"/>
       </p:ext>
     </p:extLst>
   </p:cSld>
@@ -4370,7 +4578,7 @@
               <a:rPr lang="en-US" dirty="0" smtClean="0">
                 <a:cs typeface="Abadi MT Condensed Extra Bold"/>
               </a:rPr>
-              <a:t>CATS</a:t>
+              <a:t>Options</a:t>
             </a:r>
             <a:endParaRPr lang="en-US" dirty="0">
               <a:cs typeface="Abadi MT Condensed Extra Bold"/>
@@ -4378,58 +4586,97 @@
           </a:p>
         </p:txBody>
       </p:sp>
-      <p:pic>
-        <p:nvPicPr>
-          <p:cNvPr id="4" name="Picture 3"/>
-          <p:cNvPicPr>
-            <a:picLocks noChangeAspect="1"/>
-          </p:cNvPicPr>
+      <p:sp>
+        <p:nvSpPr>
+          <p:cNvPr id="4" name="TextBox 3"/>
+          <p:cNvSpPr txBox="1"/>
           <p:nvPr/>
-        </p:nvPicPr>
-        <p:blipFill>
-          <a:blip r:embed="rId2"/>
-          <a:stretch>
-            <a:fillRect/>
-          </a:stretch>
-        </p:blipFill>
-        <p:spPr>
-          <a:xfrm>
-            <a:off x="496025" y="1054094"/>
-            <a:ext cx="5674615" cy="3463472"/>
+        </p:nvSpPr>
+        <p:spPr>
+          <a:xfrm>
+            <a:off x="1061356" y="1587500"/>
+            <a:ext cx="5705929" cy="2031325"/>
           </a:xfrm>
           <a:prstGeom prst="rect">
             <a:avLst/>
           </a:prstGeom>
-        </p:spPr>
-      </p:pic>
-      <p:pic>
-        <p:nvPicPr>
-          <p:cNvPr id="5" name="Picture 4"/>
-          <p:cNvPicPr>
-            <a:picLocks noChangeAspect="1"/>
-          </p:cNvPicPr>
-          <p:nvPr/>
-        </p:nvPicPr>
-        <p:blipFill>
-          <a:blip r:embed="rId3"/>
-          <a:stretch>
-            <a:fillRect/>
-          </a:stretch>
-        </p:blipFill>
-        <p:spPr>
-          <a:xfrm>
-            <a:off x="496025" y="4822371"/>
-            <a:ext cx="7607300" cy="1422400"/>
-          </a:xfrm>
-          <a:prstGeom prst="rect">
-            <a:avLst/>
-          </a:prstGeom>
-        </p:spPr>
-      </p:pic>
+          <a:noFill/>
+        </p:spPr>
+        <p:txBody>
+          <a:bodyPr wrap="square" rtlCol="0">
+            <a:spAutoFit/>
+          </a:bodyPr>
+          <a:lstStyle/>
+          <a:p>
+            <a:pPr marL="285750" indent="-285750">
+              <a:buFont typeface="Arial"/>
+              <a:buChar char="•"/>
+            </a:pPr>
+            <a:r>
+              <a:rPr lang="en-US" dirty="0" smtClean="0"/>
+              <a:t>Pros</a:t>
+            </a:r>
+          </a:p>
+          <a:p>
+            <a:pPr marL="742950" lvl="1" indent="-285750">
+              <a:buFont typeface="Arial"/>
+              <a:buChar char="•"/>
+            </a:pPr>
+            <a:r>
+              <a:rPr lang="en-US" dirty="0" smtClean="0"/>
+              <a:t>Custom validation can be added easily</a:t>
+            </a:r>
+          </a:p>
+          <a:p>
+            <a:pPr marL="742950" lvl="1" indent="-285750">
+              <a:buFont typeface="Arial"/>
+              <a:buChar char="•"/>
+            </a:pPr>
+            <a:r>
+              <a:rPr lang="en-US" dirty="0" smtClean="0"/>
+              <a:t>Multiple validation results can be shown</a:t>
+            </a:r>
+          </a:p>
+          <a:p>
+            <a:pPr lvl="1"/>
+            <a:endParaRPr lang="en-US" dirty="0"/>
+          </a:p>
+          <a:p>
+            <a:pPr marL="285750" indent="-285750">
+              <a:buFont typeface="Arial"/>
+              <a:buChar char="•"/>
+            </a:pPr>
+            <a:r>
+              <a:rPr lang="en-US" dirty="0" smtClean="0"/>
+              <a:t>Cons</a:t>
+            </a:r>
+          </a:p>
+          <a:p>
+            <a:pPr marL="742950" lvl="1" indent="-285750">
+              <a:buFont typeface="Arial"/>
+              <a:buChar char="•"/>
+            </a:pPr>
+            <a:r>
+              <a:rPr lang="en-US" dirty="0" smtClean="0"/>
+              <a:t>Difficult to read failures</a:t>
+            </a:r>
+          </a:p>
+          <a:p>
+            <a:pPr marL="742950" lvl="1" indent="-285750">
+              <a:buFont typeface="Arial"/>
+              <a:buChar char="•"/>
+            </a:pPr>
+            <a:r>
+              <a:rPr lang="en-US" dirty="0" smtClean="0"/>
+              <a:t>Process continues on failures </a:t>
+            </a:r>
+          </a:p>
+        </p:txBody>
+      </p:sp>
     </p:spTree>
     <p:extLst>
       <p:ext uri="{BB962C8B-B14F-4D97-AF65-F5344CB8AC3E}">
-        <p14:creationId xmlns:p14="http://schemas.microsoft.com/office/powerpoint/2010/main" val="1605903372"/>
+        <p14:creationId xmlns:p14="http://schemas.microsoft.com/office/powerpoint/2010/main" val="3423517851"/>
       </p:ext>
     </p:extLst>
   </p:cSld>
@@ -4488,7 +4735,7 @@
               <a:rPr lang="en-US" dirty="0" smtClean="0">
                 <a:cs typeface="Abadi MT Condensed Extra Bold"/>
               </a:rPr>
-              <a:t>CATS more …</a:t>
+              <a:t>Either</a:t>
             </a:r>
             <a:endParaRPr lang="en-US" dirty="0">
               <a:cs typeface="Abadi MT Condensed Extra Bold"/>
@@ -4498,7 +4745,7 @@
       </p:sp>
       <p:pic>
         <p:nvPicPr>
-          <p:cNvPr id="2" name="Picture 1"/>
+          <p:cNvPr id="8" name="Picture 7"/>
           <p:cNvPicPr>
             <a:picLocks noChangeAspect="1"/>
           </p:cNvPicPr>
@@ -4512,8 +4759,8 @@
         </p:blipFill>
         <p:spPr>
           <a:xfrm>
-            <a:off x="496025" y="1010557"/>
-            <a:ext cx="6930571" cy="4878129"/>
+            <a:off x="139699" y="2975663"/>
+            <a:ext cx="7265931" cy="848968"/>
           </a:xfrm>
           <a:prstGeom prst="rect">
             <a:avLst/>
@@ -4522,7 +4769,7 @@
       </p:pic>
       <p:pic>
         <p:nvPicPr>
-          <p:cNvPr id="6" name="Picture 5"/>
+          <p:cNvPr id="9" name="Picture 8"/>
           <p:cNvPicPr>
             <a:picLocks noChangeAspect="1"/>
           </p:cNvPicPr>
@@ -4536,8 +4783,80 @@
         </p:blipFill>
         <p:spPr>
           <a:xfrm>
-            <a:off x="496025" y="6006680"/>
-            <a:ext cx="4644207" cy="735716"/>
+            <a:off x="139700" y="3915341"/>
+            <a:ext cx="7265931" cy="892508"/>
+          </a:xfrm>
+          <a:prstGeom prst="rect">
+            <a:avLst/>
+          </a:prstGeom>
+        </p:spPr>
+      </p:pic>
+      <p:pic>
+        <p:nvPicPr>
+          <p:cNvPr id="10" name="Picture 9"/>
+          <p:cNvPicPr>
+            <a:picLocks noChangeAspect="1"/>
+          </p:cNvPicPr>
+          <p:nvPr/>
+        </p:nvPicPr>
+        <p:blipFill>
+          <a:blip r:embed="rId4"/>
+          <a:stretch>
+            <a:fillRect/>
+          </a:stretch>
+        </p:blipFill>
+        <p:spPr>
+          <a:xfrm>
+            <a:off x="139700" y="4904455"/>
+            <a:ext cx="7265931" cy="892508"/>
+          </a:xfrm>
+          <a:prstGeom prst="rect">
+            <a:avLst/>
+          </a:prstGeom>
+        </p:spPr>
+      </p:pic>
+      <p:pic>
+        <p:nvPicPr>
+          <p:cNvPr id="11" name="Picture 10"/>
+          <p:cNvPicPr>
+            <a:picLocks noChangeAspect="1"/>
+          </p:cNvPicPr>
+          <p:nvPr/>
+        </p:nvPicPr>
+        <p:blipFill>
+          <a:blip r:embed="rId5"/>
+          <a:stretch>
+            <a:fillRect/>
+          </a:stretch>
+        </p:blipFill>
+        <p:spPr>
+          <a:xfrm>
+            <a:off x="181146" y="5861951"/>
+            <a:ext cx="7224485" cy="887417"/>
+          </a:xfrm>
+          <a:prstGeom prst="rect">
+            <a:avLst/>
+          </a:prstGeom>
+        </p:spPr>
+      </p:pic>
+      <p:pic>
+        <p:nvPicPr>
+          <p:cNvPr id="12" name="Picture 11"/>
+          <p:cNvPicPr>
+            <a:picLocks noChangeAspect="1"/>
+          </p:cNvPicPr>
+          <p:nvPr/>
+        </p:nvPicPr>
+        <p:blipFill>
+          <a:blip r:embed="rId6"/>
+          <a:stretch>
+            <a:fillRect/>
+          </a:stretch>
+        </p:blipFill>
+        <p:spPr>
+          <a:xfrm>
+            <a:off x="139700" y="1010557"/>
+            <a:ext cx="7543800" cy="1872421"/>
           </a:xfrm>
           <a:prstGeom prst="rect">
             <a:avLst/>
@@ -4547,7 +4866,7 @@
     </p:spTree>
     <p:extLst>
       <p:ext uri="{BB962C8B-B14F-4D97-AF65-F5344CB8AC3E}">
-        <p14:creationId xmlns:p14="http://schemas.microsoft.com/office/powerpoint/2010/main" val="2782403922"/>
+        <p14:creationId xmlns:p14="http://schemas.microsoft.com/office/powerpoint/2010/main" val="2459738090"/>
       </p:ext>
     </p:extLst>
   </p:cSld>
@@ -4603,11 +4922,14 @@
           <a:p>
             <a:pPr algn="ctr"/>
             <a:r>
-              <a:rPr lang="en-US" sz="4000" dirty="0" smtClean="0">
+              <a:rPr lang="en-US" dirty="0" smtClean="0">
                 <a:cs typeface="Abadi MT Condensed Extra Bold"/>
               </a:rPr>
-              <a:t>Final Solution Recommended</a:t>
-            </a:r>
+              <a:t>Either</a:t>
+            </a:r>
+            <a:endParaRPr lang="en-US" dirty="0">
+              <a:cs typeface="Abadi MT Condensed Extra Bold"/>
+            </a:endParaRPr>
           </a:p>
         </p:txBody>
       </p:sp>
@@ -4619,8 +4941,8 @@
         </p:nvSpPr>
         <p:spPr>
           <a:xfrm>
-            <a:off x="1096868" y="1335934"/>
-            <a:ext cx="7117269" cy="369332"/>
+            <a:off x="1061356" y="1587500"/>
+            <a:ext cx="6132287" cy="2031325"/>
           </a:xfrm>
           <a:prstGeom prst="rect">
             <a:avLst/>
@@ -4639,32 +4961,363 @@
             </a:pPr>
             <a:r>
               <a:rPr lang="en-US" dirty="0" smtClean="0"/>
-              <a:t>Use </a:t>
+              <a:t>Pros</a:t>
+            </a:r>
+          </a:p>
+          <a:p>
+            <a:pPr marL="742950" lvl="1" indent="-285750">
+              <a:buFont typeface="Arial"/>
+              <a:buChar char="•"/>
+            </a:pPr>
+            <a:r>
+              <a:rPr lang="en-US" dirty="0" smtClean="0"/>
+              <a:t>Custom validation can be added easily</a:t>
+            </a:r>
+          </a:p>
+          <a:p>
+            <a:pPr marL="742950" lvl="1" indent="-285750">
+              <a:buFont typeface="Arial"/>
+              <a:buChar char="•"/>
+            </a:pPr>
+            <a:r>
+              <a:rPr lang="en-US" dirty="0" smtClean="0"/>
+              <a:t>System </a:t>
             </a:r>
             <a:r>
               <a:rPr lang="en-US" dirty="0" err="1" smtClean="0"/>
-              <a:t>Json</a:t>
+              <a:t>doesn</a:t>
+            </a:r>
+            <a:r>
+              <a:rPr lang="fr-FR" dirty="0" smtClean="0"/>
+              <a:t>’</a:t>
             </a:r>
             <a:r>
               <a:rPr lang="en-US" dirty="0" smtClean="0"/>
-              <a:t> </a:t>
-            </a:r>
-            <a:r>
-              <a:rPr lang="en-US" dirty="0" err="1" smtClean="0"/>
-              <a:t>Combinators</a:t>
-            </a:r>
+              <a:t>t need to go through the entire process on failures</a:t>
+            </a:r>
+          </a:p>
+          <a:p>
+            <a:pPr lvl="1"/>
+            <a:endParaRPr lang="en-US" dirty="0"/>
+          </a:p>
+          <a:p>
+            <a:pPr marL="285750" indent="-285750">
+              <a:buFont typeface="Arial"/>
+              <a:buChar char="•"/>
+            </a:pPr>
             <a:r>
               <a:rPr lang="en-US" dirty="0" smtClean="0"/>
-              <a:t> + CATS</a:t>
-            </a:r>
-            <a:endParaRPr lang="en-US" dirty="0"/>
+              <a:t>Cons</a:t>
+            </a:r>
+          </a:p>
+          <a:p>
+            <a:pPr marL="742950" lvl="1" indent="-285750">
+              <a:buFont typeface="Arial"/>
+              <a:buChar char="•"/>
+            </a:pPr>
+            <a:r>
+              <a:rPr lang="en-US" dirty="0" smtClean="0"/>
+              <a:t>Shows one failure at a time  </a:t>
+            </a:r>
           </a:p>
         </p:txBody>
       </p:sp>
     </p:spTree>
     <p:extLst>
       <p:ext uri="{BB962C8B-B14F-4D97-AF65-F5344CB8AC3E}">
-        <p14:creationId xmlns:p14="http://schemas.microsoft.com/office/powerpoint/2010/main" val="3542924606"/>
+        <p14:creationId xmlns:p14="http://schemas.microsoft.com/office/powerpoint/2010/main" val="4187014200"/>
+      </p:ext>
+    </p:extLst>
+  </p:cSld>
+  <p:clrMapOvr>
+    <a:masterClrMapping/>
+  </p:clrMapOvr>
+  <p:timing>
+    <p:tnLst>
+      <p:par>
+        <p:cTn xmlns:p14="http://schemas.microsoft.com/office/powerpoint/2010/main" id="1" dur="indefinite" restart="never" nodeType="tmRoot"/>
+      </p:par>
+    </p:tnLst>
+  </p:timing>
+</p:sld>
+</file>
+
+<file path=ppt/slides/slide8.xml><?xml version="1.0" encoding="utf-8"?>
+<p:sld xmlns:a="http://schemas.openxmlformats.org/drawingml/2006/main" xmlns:r="http://schemas.openxmlformats.org/officeDocument/2006/relationships" xmlns:p="http://schemas.openxmlformats.org/presentationml/2006/main">
+  <p:cSld>
+    <p:spTree>
+      <p:nvGrpSpPr>
+        <p:cNvPr id="1" name=""/>
+        <p:cNvGrpSpPr/>
+        <p:nvPr/>
+      </p:nvGrpSpPr>
+      <p:grpSpPr>
+        <a:xfrm>
+          <a:off x="0" y="0"/>
+          <a:ext cx="0" cy="0"/>
+          <a:chOff x="0" y="0"/>
+          <a:chExt cx="0" cy="0"/>
+        </a:xfrm>
+      </p:grpSpPr>
+      <p:sp>
+        <p:nvSpPr>
+          <p:cNvPr id="3" name="Title 2"/>
+          <p:cNvSpPr>
+            <a:spLocks noGrp="1"/>
+          </p:cNvSpPr>
+          <p:nvPr>
+            <p:ph type="title"/>
+          </p:nvPr>
+        </p:nvSpPr>
+        <p:spPr>
+          <a:xfrm>
+            <a:off x="496025" y="96157"/>
+            <a:ext cx="7543800" cy="914400"/>
+          </a:xfrm>
+        </p:spPr>
+        <p:txBody>
+          <a:bodyPr/>
+          <a:lstStyle/>
+          <a:p>
+            <a:pPr algn="ctr"/>
+            <a:r>
+              <a:rPr lang="en-US" dirty="0" smtClean="0">
+                <a:cs typeface="Abadi MT Condensed Extra Bold"/>
+              </a:rPr>
+              <a:t>CATS</a:t>
+            </a:r>
+            <a:endParaRPr lang="en-US" dirty="0">
+              <a:cs typeface="Abadi MT Condensed Extra Bold"/>
+            </a:endParaRPr>
+          </a:p>
+        </p:txBody>
+      </p:sp>
+      <p:pic>
+        <p:nvPicPr>
+          <p:cNvPr id="2" name="Picture 1"/>
+          <p:cNvPicPr>
+            <a:picLocks noChangeAspect="1"/>
+          </p:cNvPicPr>
+          <p:nvPr/>
+        </p:nvPicPr>
+        <p:blipFill>
+          <a:blip r:embed="rId2"/>
+          <a:stretch>
+            <a:fillRect/>
+          </a:stretch>
+        </p:blipFill>
+        <p:spPr>
+          <a:xfrm>
+            <a:off x="496025" y="1010557"/>
+            <a:ext cx="5346700" cy="1041400"/>
+          </a:xfrm>
+          <a:prstGeom prst="rect">
+            <a:avLst/>
+          </a:prstGeom>
+        </p:spPr>
+      </p:pic>
+      <p:pic>
+        <p:nvPicPr>
+          <p:cNvPr id="6" name="Picture 5"/>
+          <p:cNvPicPr>
+            <a:picLocks noChangeAspect="1"/>
+          </p:cNvPicPr>
+          <p:nvPr/>
+        </p:nvPicPr>
+        <p:blipFill>
+          <a:blip r:embed="rId3"/>
+          <a:stretch>
+            <a:fillRect/>
+          </a:stretch>
+        </p:blipFill>
+        <p:spPr>
+          <a:xfrm>
+            <a:off x="496024" y="2087902"/>
+            <a:ext cx="5649893" cy="4616607"/>
+          </a:xfrm>
+          <a:prstGeom prst="rect">
+            <a:avLst/>
+          </a:prstGeom>
+        </p:spPr>
+      </p:pic>
+    </p:spTree>
+    <p:extLst>
+      <p:ext uri="{BB962C8B-B14F-4D97-AF65-F5344CB8AC3E}">
+        <p14:creationId xmlns:p14="http://schemas.microsoft.com/office/powerpoint/2010/main" val="1605903372"/>
+      </p:ext>
+    </p:extLst>
+  </p:cSld>
+  <p:clrMapOvr>
+    <a:masterClrMapping/>
+  </p:clrMapOvr>
+  <p:timing>
+    <p:tnLst>
+      <p:par>
+        <p:cTn xmlns:p14="http://schemas.microsoft.com/office/powerpoint/2010/main" id="1" dur="indefinite" restart="never" nodeType="tmRoot"/>
+      </p:par>
+    </p:tnLst>
+  </p:timing>
+</p:sld>
+</file>
+
+<file path=ppt/slides/slide9.xml><?xml version="1.0" encoding="utf-8"?>
+<p:sld xmlns:a="http://schemas.openxmlformats.org/drawingml/2006/main" xmlns:r="http://schemas.openxmlformats.org/officeDocument/2006/relationships" xmlns:p="http://schemas.openxmlformats.org/presentationml/2006/main">
+  <p:cSld>
+    <p:spTree>
+      <p:nvGrpSpPr>
+        <p:cNvPr id="1" name=""/>
+        <p:cNvGrpSpPr/>
+        <p:nvPr/>
+      </p:nvGrpSpPr>
+      <p:grpSpPr>
+        <a:xfrm>
+          <a:off x="0" y="0"/>
+          <a:ext cx="0" cy="0"/>
+          <a:chOff x="0" y="0"/>
+          <a:chExt cx="0" cy="0"/>
+        </a:xfrm>
+      </p:grpSpPr>
+      <p:sp>
+        <p:nvSpPr>
+          <p:cNvPr id="3" name="Title 2"/>
+          <p:cNvSpPr>
+            <a:spLocks noGrp="1"/>
+          </p:cNvSpPr>
+          <p:nvPr>
+            <p:ph type="title"/>
+          </p:nvPr>
+        </p:nvSpPr>
+        <p:spPr>
+          <a:xfrm>
+            <a:off x="496025" y="96157"/>
+            <a:ext cx="7543800" cy="914400"/>
+          </a:xfrm>
+        </p:spPr>
+        <p:txBody>
+          <a:bodyPr/>
+          <a:lstStyle/>
+          <a:p>
+            <a:pPr algn="ctr"/>
+            <a:r>
+              <a:rPr lang="en-US" dirty="0" smtClean="0">
+                <a:cs typeface="Abadi MT Condensed Extra Bold"/>
+              </a:rPr>
+              <a:t>CATS</a:t>
+            </a:r>
+            <a:endParaRPr lang="en-US" dirty="0">
+              <a:cs typeface="Abadi MT Condensed Extra Bold"/>
+            </a:endParaRPr>
+          </a:p>
+        </p:txBody>
+      </p:sp>
+      <p:sp>
+        <p:nvSpPr>
+          <p:cNvPr id="4" name="TextBox 3"/>
+          <p:cNvSpPr txBox="1"/>
+          <p:nvPr/>
+        </p:nvSpPr>
+        <p:spPr>
+          <a:xfrm>
+            <a:off x="1061356" y="1587500"/>
+            <a:ext cx="6132287" cy="2031325"/>
+          </a:xfrm>
+          <a:prstGeom prst="rect">
+            <a:avLst/>
+          </a:prstGeom>
+          <a:noFill/>
+        </p:spPr>
+        <p:txBody>
+          <a:bodyPr wrap="square" rtlCol="0">
+            <a:spAutoFit/>
+          </a:bodyPr>
+          <a:lstStyle/>
+          <a:p>
+            <a:pPr marL="285750" indent="-285750">
+              <a:buFont typeface="Arial"/>
+              <a:buChar char="•"/>
+            </a:pPr>
+            <a:r>
+              <a:rPr lang="en-US" dirty="0" smtClean="0"/>
+              <a:t>Pros</a:t>
+            </a:r>
+          </a:p>
+          <a:p>
+            <a:pPr marL="742950" lvl="1" indent="-285750">
+              <a:buFont typeface="Arial"/>
+              <a:buChar char="•"/>
+            </a:pPr>
+            <a:r>
+              <a:rPr lang="en-US" dirty="0" smtClean="0"/>
+              <a:t>Custom validation can be added easily</a:t>
+            </a:r>
+          </a:p>
+          <a:p>
+            <a:pPr marL="742950" lvl="1" indent="-285750">
+              <a:buFont typeface="Arial"/>
+              <a:buChar char="•"/>
+            </a:pPr>
+            <a:r>
+              <a:rPr lang="en-US" dirty="0" smtClean="0"/>
+              <a:t>System </a:t>
+            </a:r>
+            <a:r>
+              <a:rPr lang="en-US" dirty="0" err="1" smtClean="0"/>
+              <a:t>doesn</a:t>
+            </a:r>
+            <a:r>
+              <a:rPr lang="fr-FR" dirty="0" smtClean="0"/>
+              <a:t>’</a:t>
+            </a:r>
+            <a:r>
+              <a:rPr lang="en-US" dirty="0" smtClean="0"/>
+              <a:t>t need to go through the entire process on failures</a:t>
+            </a:r>
+          </a:p>
+          <a:p>
+            <a:pPr marL="742950" lvl="1" indent="-285750">
+              <a:buFont typeface="Arial"/>
+              <a:buChar char="•"/>
+            </a:pPr>
+            <a:r>
+              <a:rPr lang="en-US" dirty="0" smtClean="0"/>
+              <a:t>Failures can be handled easily</a:t>
+            </a:r>
+            <a:endParaRPr lang="en-US" dirty="0"/>
+          </a:p>
+          <a:p>
+            <a:pPr marL="285750" indent="-285750">
+              <a:buFont typeface="Arial"/>
+              <a:buChar char="•"/>
+            </a:pPr>
+            <a:r>
+              <a:rPr lang="en-US" dirty="0" smtClean="0"/>
+              <a:t>Cons</a:t>
+            </a:r>
+          </a:p>
+          <a:p>
+            <a:pPr marL="742950" lvl="1" indent="-285750">
+              <a:buFont typeface="Arial"/>
+              <a:buChar char="•"/>
+            </a:pPr>
+            <a:r>
+              <a:rPr lang="en-US" dirty="0" err="1" smtClean="0"/>
+              <a:t>Doesn</a:t>
+            </a:r>
+            <a:r>
+              <a:rPr lang="fr-FR" dirty="0" smtClean="0"/>
+              <a:t>’</a:t>
+            </a:r>
+            <a:r>
+              <a:rPr lang="en-US" dirty="0" smtClean="0"/>
+              <a:t>t show reasons for failure</a:t>
+            </a:r>
+          </a:p>
+        </p:txBody>
+      </p:sp>
+    </p:spTree>
+    <p:extLst>
+      <p:ext uri="{BB962C8B-B14F-4D97-AF65-F5344CB8AC3E}">
+        <p14:creationId xmlns:p14="http://schemas.microsoft.com/office/powerpoint/2010/main" val="3369608319"/>
       </p:ext>
     </p:extLst>
   </p:cSld>

</xml_diff>